<commit_message>
Green's function 그림 그리는 중~
</commit_message>
<xml_diff>
--- a/pics/2021-06-09-Greens_function/pics.pptx
+++ b/pics/2021-06-09-Greens_function/pics.pptx
@@ -106,6 +106,22 @@
       </a:defRPr>
     </a:lvl9pPr>
   </p:defaultTextStyle>
+  <p:extLst>
+    <p:ext uri="{EFAFB233-063F-42B5-8137-9DF3F51BA10A}">
+      <p15:sldGuideLst xmlns:p15="http://schemas.microsoft.com/office/powerpoint/2012/main">
+        <p15:guide id="1" orient="horz" pos="2160">
+          <p15:clr>
+            <a:srgbClr val="A4A3A4"/>
+          </p15:clr>
+        </p15:guide>
+        <p15:guide id="2" pos="2880">
+          <p15:clr>
+            <a:srgbClr val="A4A3A4"/>
+          </p15:clr>
+        </p15:guide>
+      </p15:sldGuideLst>
+    </p:ext>
+  </p:extLst>
 </p:presentation>
 </file>
 
@@ -147,10 +163,9 @@
           <a:lstStyle/>
           <a:p>
             <a:r>
-              <a:rPr lang="ko-KR" altLang="en-US" smtClean="0"/>
+              <a:rPr lang="ko-KR" altLang="en-US"/>
               <a:t>마스터 제목 스타일 편집</a:t>
             </a:r>
-            <a:endParaRPr lang="ko-KR" altLang="en-US"/>
           </a:p>
         </p:txBody>
       </p:sp>
@@ -266,10 +281,9 @@
           </a:lstStyle>
           <a:p>
             <a:r>
-              <a:rPr lang="ko-KR" altLang="en-US" smtClean="0"/>
+              <a:rPr lang="ko-KR" altLang="en-US"/>
               <a:t>마스터 부제목 스타일 편집</a:t>
             </a:r>
-            <a:endParaRPr lang="ko-KR" altLang="en-US"/>
           </a:p>
         </p:txBody>
       </p:sp>
@@ -379,10 +393,9 @@
           <a:lstStyle/>
           <a:p>
             <a:r>
-              <a:rPr lang="ko-KR" altLang="en-US" smtClean="0"/>
+              <a:rPr lang="ko-KR" altLang="en-US"/>
               <a:t>마스터 제목 스타일 편집</a:t>
             </a:r>
-            <a:endParaRPr lang="ko-KR" altLang="en-US"/>
           </a:p>
         </p:txBody>
       </p:sp>
@@ -403,38 +416,37 @@
           <a:p>
             <a:pPr lvl="0"/>
             <a:r>
-              <a:rPr lang="ko-KR" altLang="en-US" smtClean="0"/>
+              <a:rPr lang="ko-KR" altLang="en-US"/>
               <a:t>마스터 텍스트 스타일을 편집합니다</a:t>
             </a:r>
           </a:p>
           <a:p>
             <a:pPr lvl="1"/>
             <a:r>
-              <a:rPr lang="ko-KR" altLang="en-US" smtClean="0"/>
+              <a:rPr lang="ko-KR" altLang="en-US"/>
               <a:t>둘째 수준</a:t>
             </a:r>
           </a:p>
           <a:p>
             <a:pPr lvl="2"/>
             <a:r>
-              <a:rPr lang="ko-KR" altLang="en-US" smtClean="0"/>
+              <a:rPr lang="ko-KR" altLang="en-US"/>
               <a:t>셋째 수준</a:t>
             </a:r>
           </a:p>
           <a:p>
             <a:pPr lvl="3"/>
             <a:r>
-              <a:rPr lang="ko-KR" altLang="en-US" smtClean="0"/>
+              <a:rPr lang="ko-KR" altLang="en-US"/>
               <a:t>넷째 수준</a:t>
             </a:r>
           </a:p>
           <a:p>
             <a:pPr lvl="4"/>
             <a:r>
-              <a:rPr lang="ko-KR" altLang="en-US" smtClean="0"/>
+              <a:rPr lang="ko-KR" altLang="en-US"/>
               <a:t>다섯째 수준</a:t>
             </a:r>
-            <a:endParaRPr lang="ko-KR" altLang="en-US"/>
           </a:p>
         </p:txBody>
       </p:sp>
@@ -549,10 +561,9 @@
           <a:lstStyle/>
           <a:p>
             <a:r>
-              <a:rPr lang="ko-KR" altLang="en-US" smtClean="0"/>
+              <a:rPr lang="ko-KR" altLang="en-US"/>
               <a:t>마스터 제목 스타일 편집</a:t>
             </a:r>
-            <a:endParaRPr lang="ko-KR" altLang="en-US"/>
           </a:p>
         </p:txBody>
       </p:sp>
@@ -578,38 +589,37 @@
           <a:p>
             <a:pPr lvl="0"/>
             <a:r>
-              <a:rPr lang="ko-KR" altLang="en-US" smtClean="0"/>
+              <a:rPr lang="ko-KR" altLang="en-US"/>
               <a:t>마스터 텍스트 스타일을 편집합니다</a:t>
             </a:r>
           </a:p>
           <a:p>
             <a:pPr lvl="1"/>
             <a:r>
-              <a:rPr lang="ko-KR" altLang="en-US" smtClean="0"/>
+              <a:rPr lang="ko-KR" altLang="en-US"/>
               <a:t>둘째 수준</a:t>
             </a:r>
           </a:p>
           <a:p>
             <a:pPr lvl="2"/>
             <a:r>
-              <a:rPr lang="ko-KR" altLang="en-US" smtClean="0"/>
+              <a:rPr lang="ko-KR" altLang="en-US"/>
               <a:t>셋째 수준</a:t>
             </a:r>
           </a:p>
           <a:p>
             <a:pPr lvl="3"/>
             <a:r>
-              <a:rPr lang="ko-KR" altLang="en-US" smtClean="0"/>
+              <a:rPr lang="ko-KR" altLang="en-US"/>
               <a:t>넷째 수준</a:t>
             </a:r>
           </a:p>
           <a:p>
             <a:pPr lvl="4"/>
             <a:r>
-              <a:rPr lang="ko-KR" altLang="en-US" smtClean="0"/>
+              <a:rPr lang="ko-KR" altLang="en-US"/>
               <a:t>다섯째 수준</a:t>
             </a:r>
-            <a:endParaRPr lang="ko-KR" altLang="en-US"/>
           </a:p>
         </p:txBody>
       </p:sp>
@@ -719,10 +729,9 @@
           <a:lstStyle/>
           <a:p>
             <a:r>
-              <a:rPr lang="ko-KR" altLang="en-US" smtClean="0"/>
+              <a:rPr lang="ko-KR" altLang="en-US"/>
               <a:t>마스터 제목 스타일 편집</a:t>
             </a:r>
-            <a:endParaRPr lang="ko-KR" altLang="en-US"/>
           </a:p>
         </p:txBody>
       </p:sp>
@@ -743,38 +752,37 @@
           <a:p>
             <a:pPr lvl="0"/>
             <a:r>
-              <a:rPr lang="ko-KR" altLang="en-US" smtClean="0"/>
+              <a:rPr lang="ko-KR" altLang="en-US"/>
               <a:t>마스터 텍스트 스타일을 편집합니다</a:t>
             </a:r>
           </a:p>
           <a:p>
             <a:pPr lvl="1"/>
             <a:r>
-              <a:rPr lang="ko-KR" altLang="en-US" smtClean="0"/>
+              <a:rPr lang="ko-KR" altLang="en-US"/>
               <a:t>둘째 수준</a:t>
             </a:r>
           </a:p>
           <a:p>
             <a:pPr lvl="2"/>
             <a:r>
-              <a:rPr lang="ko-KR" altLang="en-US" smtClean="0"/>
+              <a:rPr lang="ko-KR" altLang="en-US"/>
               <a:t>셋째 수준</a:t>
             </a:r>
           </a:p>
           <a:p>
             <a:pPr lvl="3"/>
             <a:r>
-              <a:rPr lang="ko-KR" altLang="en-US" smtClean="0"/>
+              <a:rPr lang="ko-KR" altLang="en-US"/>
               <a:t>넷째 수준</a:t>
             </a:r>
           </a:p>
           <a:p>
             <a:pPr lvl="4"/>
             <a:r>
-              <a:rPr lang="ko-KR" altLang="en-US" smtClean="0"/>
+              <a:rPr lang="ko-KR" altLang="en-US"/>
               <a:t>다섯째 수준</a:t>
             </a:r>
-            <a:endParaRPr lang="ko-KR" altLang="en-US"/>
           </a:p>
         </p:txBody>
       </p:sp>
@@ -893,10 +901,9 @@
           </a:lstStyle>
           <a:p>
             <a:r>
-              <a:rPr lang="ko-KR" altLang="en-US" smtClean="0"/>
+              <a:rPr lang="ko-KR" altLang="en-US"/>
               <a:t>마스터 제목 스타일 편집</a:t>
             </a:r>
-            <a:endParaRPr lang="ko-KR" altLang="en-US"/>
           </a:p>
         </p:txBody>
       </p:sp>
@@ -1013,7 +1020,7 @@
           <a:p>
             <a:pPr lvl="0"/>
             <a:r>
-              <a:rPr lang="ko-KR" altLang="en-US" smtClean="0"/>
+              <a:rPr lang="ko-KR" altLang="en-US"/>
               <a:t>마스터 텍스트 스타일을 편집합니다</a:t>
             </a:r>
           </a:p>
@@ -1125,10 +1132,9 @@
           <a:lstStyle/>
           <a:p>
             <a:r>
-              <a:rPr lang="ko-KR" altLang="en-US" smtClean="0"/>
+              <a:rPr lang="ko-KR" altLang="en-US"/>
               <a:t>마스터 제목 스타일 편집</a:t>
             </a:r>
-            <a:endParaRPr lang="ko-KR" altLang="en-US"/>
           </a:p>
         </p:txBody>
       </p:sp>
@@ -1182,38 +1188,37 @@
           <a:p>
             <a:pPr lvl="0"/>
             <a:r>
-              <a:rPr lang="ko-KR" altLang="en-US" smtClean="0"/>
+              <a:rPr lang="ko-KR" altLang="en-US"/>
               <a:t>마스터 텍스트 스타일을 편집합니다</a:t>
             </a:r>
           </a:p>
           <a:p>
             <a:pPr lvl="1"/>
             <a:r>
-              <a:rPr lang="ko-KR" altLang="en-US" smtClean="0"/>
+              <a:rPr lang="ko-KR" altLang="en-US"/>
               <a:t>둘째 수준</a:t>
             </a:r>
           </a:p>
           <a:p>
             <a:pPr lvl="2"/>
             <a:r>
-              <a:rPr lang="ko-KR" altLang="en-US" smtClean="0"/>
+              <a:rPr lang="ko-KR" altLang="en-US"/>
               <a:t>셋째 수준</a:t>
             </a:r>
           </a:p>
           <a:p>
             <a:pPr lvl="3"/>
             <a:r>
-              <a:rPr lang="ko-KR" altLang="en-US" smtClean="0"/>
+              <a:rPr lang="ko-KR" altLang="en-US"/>
               <a:t>넷째 수준</a:t>
             </a:r>
           </a:p>
           <a:p>
             <a:pPr lvl="4"/>
             <a:r>
-              <a:rPr lang="ko-KR" altLang="en-US" smtClean="0"/>
+              <a:rPr lang="ko-KR" altLang="en-US"/>
               <a:t>다섯째 수준</a:t>
             </a:r>
-            <a:endParaRPr lang="ko-KR" altLang="en-US"/>
           </a:p>
         </p:txBody>
       </p:sp>
@@ -1267,38 +1272,37 @@
           <a:p>
             <a:pPr lvl="0"/>
             <a:r>
-              <a:rPr lang="ko-KR" altLang="en-US" smtClean="0"/>
+              <a:rPr lang="ko-KR" altLang="en-US"/>
               <a:t>마스터 텍스트 스타일을 편집합니다</a:t>
             </a:r>
           </a:p>
           <a:p>
             <a:pPr lvl="1"/>
             <a:r>
-              <a:rPr lang="ko-KR" altLang="en-US" smtClean="0"/>
+              <a:rPr lang="ko-KR" altLang="en-US"/>
               <a:t>둘째 수준</a:t>
             </a:r>
           </a:p>
           <a:p>
             <a:pPr lvl="2"/>
             <a:r>
-              <a:rPr lang="ko-KR" altLang="en-US" smtClean="0"/>
+              <a:rPr lang="ko-KR" altLang="en-US"/>
               <a:t>셋째 수준</a:t>
             </a:r>
           </a:p>
           <a:p>
             <a:pPr lvl="3"/>
             <a:r>
-              <a:rPr lang="ko-KR" altLang="en-US" smtClean="0"/>
+              <a:rPr lang="ko-KR" altLang="en-US"/>
               <a:t>넷째 수준</a:t>
             </a:r>
           </a:p>
           <a:p>
             <a:pPr lvl="4"/>
             <a:r>
-              <a:rPr lang="ko-KR" altLang="en-US" smtClean="0"/>
+              <a:rPr lang="ko-KR" altLang="en-US"/>
               <a:t>다섯째 수준</a:t>
             </a:r>
-            <a:endParaRPr lang="ko-KR" altLang="en-US"/>
           </a:p>
         </p:txBody>
       </p:sp>
@@ -1412,10 +1416,9 @@
           </a:lstStyle>
           <a:p>
             <a:r>
-              <a:rPr lang="ko-KR" altLang="en-US" smtClean="0"/>
+              <a:rPr lang="ko-KR" altLang="en-US"/>
               <a:t>마스터 제목 스타일 편집</a:t>
             </a:r>
-            <a:endParaRPr lang="ko-KR" altLang="en-US"/>
           </a:p>
         </p:txBody>
       </p:sp>
@@ -1478,7 +1481,7 @@
           <a:p>
             <a:pPr lvl="0"/>
             <a:r>
-              <a:rPr lang="ko-KR" altLang="en-US" smtClean="0"/>
+              <a:rPr lang="ko-KR" altLang="en-US"/>
               <a:t>마스터 텍스트 스타일을 편집합니다</a:t>
             </a:r>
           </a:p>
@@ -1534,38 +1537,37 @@
           <a:p>
             <a:pPr lvl="0"/>
             <a:r>
-              <a:rPr lang="ko-KR" altLang="en-US" smtClean="0"/>
+              <a:rPr lang="ko-KR" altLang="en-US"/>
               <a:t>마스터 텍스트 스타일을 편집합니다</a:t>
             </a:r>
           </a:p>
           <a:p>
             <a:pPr lvl="1"/>
             <a:r>
-              <a:rPr lang="ko-KR" altLang="en-US" smtClean="0"/>
+              <a:rPr lang="ko-KR" altLang="en-US"/>
               <a:t>둘째 수준</a:t>
             </a:r>
           </a:p>
           <a:p>
             <a:pPr lvl="2"/>
             <a:r>
-              <a:rPr lang="ko-KR" altLang="en-US" smtClean="0"/>
+              <a:rPr lang="ko-KR" altLang="en-US"/>
               <a:t>셋째 수준</a:t>
             </a:r>
           </a:p>
           <a:p>
             <a:pPr lvl="3"/>
             <a:r>
-              <a:rPr lang="ko-KR" altLang="en-US" smtClean="0"/>
+              <a:rPr lang="ko-KR" altLang="en-US"/>
               <a:t>넷째 수준</a:t>
             </a:r>
           </a:p>
           <a:p>
             <a:pPr lvl="4"/>
             <a:r>
-              <a:rPr lang="ko-KR" altLang="en-US" smtClean="0"/>
+              <a:rPr lang="ko-KR" altLang="en-US"/>
               <a:t>다섯째 수준</a:t>
             </a:r>
-            <a:endParaRPr lang="ko-KR" altLang="en-US"/>
           </a:p>
         </p:txBody>
       </p:sp>
@@ -1628,7 +1630,7 @@
           <a:p>
             <a:pPr lvl="0"/>
             <a:r>
-              <a:rPr lang="ko-KR" altLang="en-US" smtClean="0"/>
+              <a:rPr lang="ko-KR" altLang="en-US"/>
               <a:t>마스터 텍스트 스타일을 편집합니다</a:t>
             </a:r>
           </a:p>
@@ -1684,38 +1686,37 @@
           <a:p>
             <a:pPr lvl="0"/>
             <a:r>
-              <a:rPr lang="ko-KR" altLang="en-US" smtClean="0"/>
+              <a:rPr lang="ko-KR" altLang="en-US"/>
               <a:t>마스터 텍스트 스타일을 편집합니다</a:t>
             </a:r>
           </a:p>
           <a:p>
             <a:pPr lvl="1"/>
             <a:r>
-              <a:rPr lang="ko-KR" altLang="en-US" smtClean="0"/>
+              <a:rPr lang="ko-KR" altLang="en-US"/>
               <a:t>둘째 수준</a:t>
             </a:r>
           </a:p>
           <a:p>
             <a:pPr lvl="2"/>
             <a:r>
-              <a:rPr lang="ko-KR" altLang="en-US" smtClean="0"/>
+              <a:rPr lang="ko-KR" altLang="en-US"/>
               <a:t>셋째 수준</a:t>
             </a:r>
           </a:p>
           <a:p>
             <a:pPr lvl="3"/>
             <a:r>
-              <a:rPr lang="ko-KR" altLang="en-US" smtClean="0"/>
+              <a:rPr lang="ko-KR" altLang="en-US"/>
               <a:t>넷째 수준</a:t>
             </a:r>
           </a:p>
           <a:p>
             <a:pPr lvl="4"/>
             <a:r>
-              <a:rPr lang="ko-KR" altLang="en-US" smtClean="0"/>
+              <a:rPr lang="ko-KR" altLang="en-US"/>
               <a:t>다섯째 수준</a:t>
             </a:r>
-            <a:endParaRPr lang="ko-KR" altLang="en-US"/>
           </a:p>
         </p:txBody>
       </p:sp>
@@ -1825,10 +1826,9 @@
           <a:lstStyle/>
           <a:p>
             <a:r>
-              <a:rPr lang="ko-KR" altLang="en-US" smtClean="0"/>
+              <a:rPr lang="ko-KR" altLang="en-US"/>
               <a:t>마스터 제목 스타일 편집</a:t>
             </a:r>
-            <a:endParaRPr lang="ko-KR" altLang="en-US"/>
           </a:p>
         </p:txBody>
       </p:sp>
@@ -2037,10 +2037,9 @@
           </a:lstStyle>
           <a:p>
             <a:r>
-              <a:rPr lang="ko-KR" altLang="en-US" smtClean="0"/>
+              <a:rPr lang="ko-KR" altLang="en-US"/>
               <a:t>마스터 제목 스타일 편집</a:t>
             </a:r>
-            <a:endParaRPr lang="ko-KR" altLang="en-US"/>
           </a:p>
         </p:txBody>
       </p:sp>
@@ -2094,38 +2093,37 @@
           <a:p>
             <a:pPr lvl="0"/>
             <a:r>
-              <a:rPr lang="ko-KR" altLang="en-US" smtClean="0"/>
+              <a:rPr lang="ko-KR" altLang="en-US"/>
               <a:t>마스터 텍스트 스타일을 편집합니다</a:t>
             </a:r>
           </a:p>
           <a:p>
             <a:pPr lvl="1"/>
             <a:r>
-              <a:rPr lang="ko-KR" altLang="en-US" smtClean="0"/>
+              <a:rPr lang="ko-KR" altLang="en-US"/>
               <a:t>둘째 수준</a:t>
             </a:r>
           </a:p>
           <a:p>
             <a:pPr lvl="2"/>
             <a:r>
-              <a:rPr lang="ko-KR" altLang="en-US" smtClean="0"/>
+              <a:rPr lang="ko-KR" altLang="en-US"/>
               <a:t>셋째 수준</a:t>
             </a:r>
           </a:p>
           <a:p>
             <a:pPr lvl="3"/>
             <a:r>
-              <a:rPr lang="ko-KR" altLang="en-US" smtClean="0"/>
+              <a:rPr lang="ko-KR" altLang="en-US"/>
               <a:t>넷째 수준</a:t>
             </a:r>
           </a:p>
           <a:p>
             <a:pPr lvl="4"/>
             <a:r>
-              <a:rPr lang="ko-KR" altLang="en-US" smtClean="0"/>
+              <a:rPr lang="ko-KR" altLang="en-US"/>
               <a:t>다섯째 수준</a:t>
             </a:r>
-            <a:endParaRPr lang="ko-KR" altLang="en-US"/>
           </a:p>
         </p:txBody>
       </p:sp>
@@ -2188,7 +2186,7 @@
           <a:p>
             <a:pPr lvl="0"/>
             <a:r>
-              <a:rPr lang="ko-KR" altLang="en-US" smtClean="0"/>
+              <a:rPr lang="ko-KR" altLang="en-US"/>
               <a:t>마스터 텍스트 스타일을 편집합니다</a:t>
             </a:r>
           </a:p>
@@ -2309,10 +2307,9 @@
           </a:lstStyle>
           <a:p>
             <a:r>
-              <a:rPr lang="ko-KR" altLang="en-US" smtClean="0"/>
+              <a:rPr lang="ko-KR" altLang="en-US"/>
               <a:t>마스터 제목 스타일 편집</a:t>
             </a:r>
-            <a:endParaRPr lang="ko-KR" altLang="en-US"/>
           </a:p>
         </p:txBody>
       </p:sp>
@@ -2436,7 +2433,7 @@
           <a:p>
             <a:pPr lvl="0"/>
             <a:r>
-              <a:rPr lang="ko-KR" altLang="en-US" smtClean="0"/>
+              <a:rPr lang="ko-KR" altLang="en-US"/>
               <a:t>마스터 텍스트 스타일을 편집합니다</a:t>
             </a:r>
           </a:p>
@@ -2563,10 +2560,9 @@
           <a:lstStyle/>
           <a:p>
             <a:r>
-              <a:rPr lang="ko-KR" altLang="en-US" smtClean="0"/>
+              <a:rPr lang="ko-KR" altLang="en-US"/>
               <a:t>마스터 제목 스타일 편집</a:t>
             </a:r>
-            <a:endParaRPr lang="ko-KR" altLang="en-US"/>
           </a:p>
         </p:txBody>
       </p:sp>
@@ -2597,38 +2593,37 @@
           <a:p>
             <a:pPr lvl="0"/>
             <a:r>
-              <a:rPr lang="ko-KR" altLang="en-US" smtClean="0"/>
+              <a:rPr lang="ko-KR" altLang="en-US"/>
               <a:t>마스터 텍스트 스타일을 편집합니다</a:t>
             </a:r>
           </a:p>
           <a:p>
             <a:pPr lvl="1"/>
             <a:r>
-              <a:rPr lang="ko-KR" altLang="en-US" smtClean="0"/>
+              <a:rPr lang="ko-KR" altLang="en-US"/>
               <a:t>둘째 수준</a:t>
             </a:r>
           </a:p>
           <a:p>
             <a:pPr lvl="2"/>
             <a:r>
-              <a:rPr lang="ko-KR" altLang="en-US" smtClean="0"/>
+              <a:rPr lang="ko-KR" altLang="en-US"/>
               <a:t>셋째 수준</a:t>
             </a:r>
           </a:p>
           <a:p>
             <a:pPr lvl="3"/>
             <a:r>
-              <a:rPr lang="ko-KR" altLang="en-US" smtClean="0"/>
+              <a:rPr lang="ko-KR" altLang="en-US"/>
               <a:t>넷째 수준</a:t>
             </a:r>
           </a:p>
           <a:p>
             <a:pPr lvl="4"/>
             <a:r>
-              <a:rPr lang="ko-KR" altLang="en-US" smtClean="0"/>
+              <a:rPr lang="ko-KR" altLang="en-US"/>
               <a:t>다섯째 수준</a:t>
             </a:r>
-            <a:endParaRPr lang="ko-KR" altLang="en-US"/>
           </a:p>
         </p:txBody>
       </p:sp>
@@ -3046,9 +3041,9 @@
         <p:grpSpPr>
           <a:xfrm>
             <a:off x="846892" y="2456892"/>
-            <a:ext cx="7450216" cy="1944216"/>
+            <a:ext cx="7421362" cy="1944216"/>
             <a:chOff x="846892" y="2852936"/>
-            <a:chExt cx="7450216" cy="1944216"/>
+            <a:chExt cx="7421362" cy="1944216"/>
           </a:xfrm>
         </p:grpSpPr>
         <p:sp>
@@ -3095,7 +3090,10 @@
             <a:lstStyle/>
             <a:p>
               <a:pPr algn="ctr"/>
-              <a:endParaRPr lang="ko-KR" altLang="en-US"/>
+              <a:endParaRPr lang="ko-KR" altLang="en-US" b="1">
+                <a:latin typeface="나눔고딕" panose="020D0604000000000000" pitchFamily="50" charset="-127"/>
+                <a:ea typeface="나눔고딕" panose="020D0604000000000000" pitchFamily="50" charset="-127"/>
+              </a:endParaRPr>
             </a:p>
           </p:txBody>
         </p:sp>
@@ -3139,10 +3137,12 @@
             <a:p>
               <a:pPr algn="ctr"/>
               <a:r>
-                <a:rPr lang="ko-KR" altLang="en-US" dirty="0" smtClean="0"/>
+                <a:rPr lang="ko-KR" altLang="en-US" b="1" dirty="0">
+                  <a:latin typeface="나눔고딕" panose="020D0604000000000000" pitchFamily="50" charset="-127"/>
+                  <a:ea typeface="나눔고딕" panose="020D0604000000000000" pitchFamily="50" charset="-127"/>
+                </a:rPr>
                 <a:t>시스템</a:t>
               </a:r>
-              <a:endParaRPr lang="ko-KR" altLang="en-US" dirty="0"/>
             </a:p>
           </p:txBody>
         </p:sp>
@@ -3186,10 +3186,16 @@
             <a:p>
               <a:pPr algn="ctr"/>
               <a:r>
-                <a:rPr lang="ko-KR" altLang="en-US" smtClean="0"/>
+                <a:rPr lang="ko-KR" altLang="en-US" b="1">
+                  <a:latin typeface="나눔고딕" panose="020D0604000000000000" pitchFamily="50" charset="-127"/>
+                  <a:ea typeface="나눔고딕" panose="020D0604000000000000" pitchFamily="50" charset="-127"/>
+                </a:rPr>
                 <a:t>피드백</a:t>
               </a:r>
-              <a:endParaRPr lang="ko-KR" altLang="en-US" dirty="0"/>
+              <a:endParaRPr lang="ko-KR" altLang="en-US" b="1" dirty="0">
+                <a:latin typeface="나눔고딕" panose="020D0604000000000000" pitchFamily="50" charset="-127"/>
+                <a:ea typeface="나눔고딕" panose="020D0604000000000000" pitchFamily="50" charset="-127"/>
+              </a:endParaRPr>
             </a:p>
           </p:txBody>
         </p:sp>
@@ -3387,7 +3393,7 @@
           <p:spPr>
             <a:xfrm>
               <a:off x="846892" y="2852936"/>
-              <a:ext cx="1189749" cy="369332"/>
+              <a:ext cx="1114408" cy="369332"/>
             </a:xfrm>
             <a:prstGeom prst="rect">
               <a:avLst/>
@@ -3401,10 +3407,12 @@
             <a:lstStyle/>
             <a:p>
               <a:r>
-                <a:rPr lang="ko-KR" altLang="en-US" dirty="0" smtClean="0"/>
+                <a:rPr lang="ko-KR" altLang="en-US" b="1" dirty="0">
+                  <a:latin typeface="나눔고딕" panose="020D0604000000000000" pitchFamily="50" charset="-127"/>
+                  <a:ea typeface="나눔고딕" panose="020D0604000000000000" pitchFamily="50" charset="-127"/>
+                </a:rPr>
                 <a:t>외부 입력</a:t>
               </a:r>
-              <a:endParaRPr lang="ko-KR" altLang="en-US" dirty="0"/>
             </a:p>
           </p:txBody>
         </p:sp>
@@ -3417,7 +3425,7 @@
           <p:spPr>
             <a:xfrm>
               <a:off x="7650777" y="2852936"/>
-              <a:ext cx="646331" cy="369332"/>
+              <a:ext cx="617477" cy="369332"/>
             </a:xfrm>
             <a:prstGeom prst="rect">
               <a:avLst/>
@@ -3431,10 +3439,16 @@
             <a:lstStyle/>
             <a:p>
               <a:r>
-                <a:rPr lang="ko-KR" altLang="en-US" smtClean="0"/>
+                <a:rPr lang="ko-KR" altLang="en-US" b="1">
+                  <a:latin typeface="나눔고딕" panose="020D0604000000000000" pitchFamily="50" charset="-127"/>
+                  <a:ea typeface="나눔고딕" panose="020D0604000000000000" pitchFamily="50" charset="-127"/>
+                </a:rPr>
                 <a:t>출력</a:t>
               </a:r>
-              <a:endParaRPr lang="ko-KR" altLang="en-US" dirty="0"/>
+              <a:endParaRPr lang="ko-KR" altLang="en-US" b="1" dirty="0">
+                <a:latin typeface="나눔고딕" panose="020D0604000000000000" pitchFamily="50" charset="-127"/>
+                <a:ea typeface="나눔고딕" panose="020D0604000000000000" pitchFamily="50" charset="-127"/>
+              </a:endParaRPr>
             </a:p>
           </p:txBody>
         </p:sp>
@@ -3477,7 +3491,10 @@
             <a:lstStyle/>
             <a:p>
               <a:pPr algn="ctr"/>
-              <a:endParaRPr lang="ko-KR" altLang="en-US"/>
+              <a:endParaRPr lang="ko-KR" altLang="en-US" b="1">
+                <a:latin typeface="나눔고딕" panose="020D0604000000000000" pitchFamily="50" charset="-127"/>
+                <a:ea typeface="나눔고딕" panose="020D0604000000000000" pitchFamily="50" charset="-127"/>
+              </a:endParaRPr>
             </a:p>
           </p:txBody>
         </p:sp>
@@ -3525,7 +3542,10 @@
           <a:lstStyle/>
           <a:p>
             <a:pPr algn="ctr"/>
-            <a:endParaRPr lang="ko-KR" altLang="en-US"/>
+            <a:endParaRPr lang="ko-KR" altLang="en-US" b="1">
+              <a:latin typeface="나눔고딕" panose="020D0604000000000000" pitchFamily="50" charset="-127"/>
+              <a:ea typeface="나눔고딕" panose="020D0604000000000000" pitchFamily="50" charset="-127"/>
+            </a:endParaRPr>
           </a:p>
         </p:txBody>
       </p:sp>
@@ -3538,7 +3558,7 @@
         <p:spPr>
           <a:xfrm>
             <a:off x="2123728" y="1115452"/>
-            <a:ext cx="2226059" cy="369332"/>
+            <a:ext cx="2129109" cy="369332"/>
           </a:xfrm>
           <a:prstGeom prst="rect">
             <a:avLst/>
@@ -3552,18 +3572,22 @@
           <a:lstStyle/>
           <a:p>
             <a:r>
-              <a:rPr lang="en-US" altLang="ko-KR" b="1" dirty="0" smtClean="0">
+              <a:rPr lang="en-US" altLang="ko-KR" b="1" dirty="0">
                 <a:solidFill>
                   <a:srgbClr val="FF0000"/>
                 </a:solidFill>
+                <a:latin typeface="나눔고딕" panose="020D0604000000000000" pitchFamily="50" charset="-127"/>
+                <a:ea typeface="나눔고딕" panose="020D0604000000000000" pitchFamily="50" charset="-127"/>
               </a:rPr>
               <a:t>System as </a:t>
             </a:r>
             <a:r>
-              <a:rPr lang="en-US" altLang="ko-KR" b="1" smtClean="0">
+              <a:rPr lang="en-US" altLang="ko-KR" b="1">
                 <a:solidFill>
                   <a:srgbClr val="FF0000"/>
                 </a:solidFill>
+                <a:latin typeface="나눔고딕" panose="020D0604000000000000" pitchFamily="50" charset="-127"/>
+                <a:ea typeface="나눔고딕" panose="020D0604000000000000" pitchFamily="50" charset="-127"/>
               </a:rPr>
               <a:t>a whole</a:t>
             </a:r>
@@ -3571,6 +3595,8 @@
               <a:solidFill>
                 <a:srgbClr val="FF0000"/>
               </a:solidFill>
+              <a:latin typeface="나눔고딕" panose="020D0604000000000000" pitchFamily="50" charset="-127"/>
+              <a:ea typeface="나눔고딕" panose="020D0604000000000000" pitchFamily="50" charset="-127"/>
             </a:endParaRPr>
           </a:p>
         </p:txBody>
@@ -3648,58 +3674,92 @@
           <a:p>
             <a:pPr algn="ctr"/>
             <a:r>
-              <a:rPr lang="ko-KR" altLang="en-US" dirty="0" smtClean="0">
+              <a:rPr lang="ko-KR" altLang="en-US" dirty="0">
                 <a:solidFill>
                   <a:schemeClr val="tx1"/>
                 </a:solidFill>
+                <a:latin typeface="나눔고딕" panose="020D0604000000000000" pitchFamily="50" charset="-127"/>
+                <a:ea typeface="나눔고딕" panose="020D0604000000000000" pitchFamily="50" charset="-127"/>
               </a:rPr>
-              <a:t>전체 미분방정식 시스템</a:t>
-            </a:r>
-            <a:endParaRPr lang="en-US" altLang="ko-KR" dirty="0" smtClean="0">
+              <a:t>전체 미분방정식</a:t>
+            </a:r>
+            <a:endParaRPr lang="en-US" altLang="ko-KR" dirty="0">
               <a:solidFill>
                 <a:schemeClr val="tx1"/>
               </a:solidFill>
+              <a:latin typeface="나눔고딕" panose="020D0604000000000000" pitchFamily="50" charset="-127"/>
+              <a:ea typeface="나눔고딕" panose="020D0604000000000000" pitchFamily="50" charset="-127"/>
             </a:endParaRPr>
           </a:p>
           <a:p>
             <a:pPr algn="ctr"/>
             <a:r>
-              <a:rPr lang="en-US" altLang="ko-KR" dirty="0" smtClean="0">
+              <a:rPr lang="ko-KR" altLang="en-US" dirty="0">
                 <a:solidFill>
                   <a:schemeClr val="tx1"/>
                 </a:solidFill>
+                <a:latin typeface="나눔고딕" panose="020D0604000000000000" pitchFamily="50" charset="-127"/>
+                <a:ea typeface="나눔고딕" panose="020D0604000000000000" pitchFamily="50" charset="-127"/>
               </a:rPr>
-              <a:t>(</a:t>
-            </a:r>
-            <a:r>
-              <a:rPr lang="ko-KR" altLang="en-US" dirty="0" smtClean="0">
+              <a:t>시스템</a:t>
+            </a:r>
+            <a:endParaRPr lang="en-US" altLang="ko-KR" dirty="0">
+              <a:solidFill>
+                <a:schemeClr val="tx1"/>
+              </a:solidFill>
+              <a:latin typeface="나눔고딕" panose="020D0604000000000000" pitchFamily="50" charset="-127"/>
+              <a:ea typeface="나눔고딕" panose="020D0604000000000000" pitchFamily="50" charset="-127"/>
+            </a:endParaRPr>
+          </a:p>
+          <a:p>
+            <a:pPr algn="ctr"/>
+            <a:r>
+              <a:rPr lang="en-US" altLang="ko-KR" dirty="0">
                 <a:solidFill>
                   <a:schemeClr val="tx1"/>
                 </a:solidFill>
+                <a:latin typeface="나눔고딕" panose="020D0604000000000000" pitchFamily="50" charset="-127"/>
+                <a:ea typeface="나눔고딕" panose="020D0604000000000000" pitchFamily="50" charset="-127"/>
               </a:rPr>
-              <a:t>제차</a:t>
-            </a:r>
-            <a:r>
-              <a:rPr lang="en-US" altLang="ko-KR" dirty="0" smtClean="0">
+              <a:t>(</a:t>
+            </a:r>
+            <a:r>
+              <a:rPr lang="ko-KR" altLang="en-US" dirty="0">
                 <a:solidFill>
                   <a:schemeClr val="tx1"/>
                 </a:solidFill>
+                <a:latin typeface="나눔고딕" panose="020D0604000000000000" pitchFamily="50" charset="-127"/>
+                <a:ea typeface="나눔고딕" panose="020D0604000000000000" pitchFamily="50" charset="-127"/>
               </a:rPr>
-              <a:t>+</a:t>
-            </a:r>
-            <a:r>
-              <a:rPr lang="ko-KR" altLang="en-US" dirty="0" smtClean="0">
+              <a:t>제차</a:t>
+            </a:r>
+            <a:r>
+              <a:rPr lang="en-US" altLang="ko-KR" dirty="0">
                 <a:solidFill>
                   <a:schemeClr val="tx1"/>
                 </a:solidFill>
+                <a:latin typeface="나눔고딕" panose="020D0604000000000000" pitchFamily="50" charset="-127"/>
+                <a:ea typeface="나눔고딕" panose="020D0604000000000000" pitchFamily="50" charset="-127"/>
               </a:rPr>
-              <a:t>비제차</a:t>
-            </a:r>
-            <a:r>
-              <a:rPr lang="en-US" altLang="ko-KR" dirty="0" smtClean="0">
+              <a:t>+</a:t>
+            </a:r>
+            <a:r>
+              <a:rPr lang="ko-KR" altLang="en-US" dirty="0">
                 <a:solidFill>
                   <a:schemeClr val="tx1"/>
                 </a:solidFill>
+                <a:latin typeface="나눔고딕" panose="020D0604000000000000" pitchFamily="50" charset="-127"/>
+                <a:ea typeface="나눔고딕" panose="020D0604000000000000" pitchFamily="50" charset="-127"/>
+              </a:rPr>
+              <a:t>비제차</a:t>
+            </a:r>
+            <a:r>
+              <a:rPr lang="en-US" altLang="ko-KR" dirty="0">
+                <a:solidFill>
+                  <a:schemeClr val="tx1"/>
+                </a:solidFill>
+                <a:latin typeface="나눔고딕" panose="020D0604000000000000" pitchFamily="50" charset="-127"/>
+                <a:ea typeface="나눔고딕" panose="020D0604000000000000" pitchFamily="50" charset="-127"/>
               </a:rPr>
               <a:t>)</a:t>
             </a:r>
@@ -3707,12 +3767,14 @@
               <a:solidFill>
                 <a:schemeClr val="tx1"/>
               </a:solidFill>
+              <a:latin typeface="나눔고딕" panose="020D0604000000000000" pitchFamily="50" charset="-127"/>
+              <a:ea typeface="나눔고딕" panose="020D0604000000000000" pitchFamily="50" charset="-127"/>
             </a:endParaRPr>
           </a:p>
         </p:txBody>
       </p:sp>
-      <mc:AlternateContent xmlns:mc="http://schemas.openxmlformats.org/markup-compatibility/2006" xmlns:a14="http://schemas.microsoft.com/office/drawing/2010/main">
-        <mc:Choice Requires="a14">
+      <mc:AlternateContent xmlns:mc="http://schemas.openxmlformats.org/markup-compatibility/2006">
+        <mc:Choice xmlns:a14="http://schemas.microsoft.com/office/drawing/2010/main" Requires="a14">
           <p:sp>
             <p:nvSpPr>
               <p:cNvPr id="5" name="TextBox 4"/>
@@ -3751,12 +3813,15 @@
                     </m:oMath>
                   </m:oMathPara>
                 </a14:m>
-                <a:endParaRPr lang="ko-KR" altLang="en-US" dirty="0"/>
+                <a:endParaRPr lang="ko-KR" altLang="en-US" dirty="0">
+                  <a:latin typeface="나눔고딕" panose="020D0604000000000000" pitchFamily="50" charset="-127"/>
+                  <a:ea typeface="나눔고딕" panose="020D0604000000000000" pitchFamily="50" charset="-127"/>
+                </a:endParaRPr>
               </a:p>
             </p:txBody>
           </p:sp>
         </mc:Choice>
-        <mc:Fallback xmlns="">
+        <mc:Fallback>
           <p:sp>
             <p:nvSpPr>
               <p:cNvPr id="5" name="TextBox 4"/>
@@ -3773,10 +3838,10 @@
               <a:prstGeom prst="rect">
                 <a:avLst/>
               </a:prstGeom>
-              <a:blipFill rotWithShape="1">
+              <a:blipFill>
                 <a:blip r:embed="rId2"/>
                 <a:stretch>
-                  <a:fillRect b="-18033"/>
+                  <a:fillRect b="-16393"/>
                 </a:stretch>
               </a:blipFill>
             </p:spPr>
@@ -3795,8 +3860,8 @@
           </p:sp>
         </mc:Fallback>
       </mc:AlternateContent>
-      <mc:AlternateContent xmlns:mc="http://schemas.openxmlformats.org/markup-compatibility/2006" xmlns:a14="http://schemas.microsoft.com/office/drawing/2010/main">
-        <mc:Choice Requires="a14">
+      <mc:AlternateContent xmlns:mc="http://schemas.openxmlformats.org/markup-compatibility/2006">
+        <mc:Choice xmlns:a14="http://schemas.microsoft.com/office/drawing/2010/main" Requires="a14">
           <p:sp>
             <p:nvSpPr>
               <p:cNvPr id="6" name="TextBox 5"/>
@@ -3835,12 +3900,15 @@
                     </m:oMath>
                   </m:oMathPara>
                 </a14:m>
-                <a:endParaRPr lang="ko-KR" altLang="en-US" dirty="0"/>
+                <a:endParaRPr lang="ko-KR" altLang="en-US" dirty="0">
+                  <a:latin typeface="나눔고딕" panose="020D0604000000000000" pitchFamily="50" charset="-127"/>
+                  <a:ea typeface="나눔고딕" panose="020D0604000000000000" pitchFamily="50" charset="-127"/>
+                </a:endParaRPr>
               </a:p>
             </p:txBody>
           </p:sp>
         </mc:Choice>
-        <mc:Fallback xmlns="">
+        <mc:Fallback>
           <p:sp>
             <p:nvSpPr>
               <p:cNvPr id="6" name="TextBox 5"/>
@@ -3857,10 +3925,10 @@
               <a:prstGeom prst="rect">
                 <a:avLst/>
               </a:prstGeom>
-              <a:blipFill rotWithShape="1">
+              <a:blipFill>
                 <a:blip r:embed="rId3"/>
                 <a:stretch>
-                  <a:fillRect b="-18033"/>
+                  <a:fillRect b="-16393"/>
                 </a:stretch>
               </a:blipFill>
             </p:spPr>
@@ -3879,8 +3947,8 @@
           </p:sp>
         </mc:Fallback>
       </mc:AlternateContent>
-      <mc:AlternateContent xmlns:mc="http://schemas.openxmlformats.org/markup-compatibility/2006" xmlns:a14="http://schemas.microsoft.com/office/drawing/2010/main">
-        <mc:Choice Requires="a14">
+      <mc:AlternateContent xmlns:mc="http://schemas.openxmlformats.org/markup-compatibility/2006">
+        <mc:Choice xmlns:a14="http://schemas.microsoft.com/office/drawing/2010/main" Requires="a14">
           <p:sp>
             <p:nvSpPr>
               <p:cNvPr id="7" name="TextBox 6"/>
@@ -3919,12 +3987,15 @@
                     </m:oMath>
                   </m:oMathPara>
                 </a14:m>
-                <a:endParaRPr lang="ko-KR" altLang="en-US" dirty="0"/>
+                <a:endParaRPr lang="ko-KR" altLang="en-US" dirty="0">
+                  <a:latin typeface="나눔고딕" panose="020D0604000000000000" pitchFamily="50" charset="-127"/>
+                  <a:ea typeface="나눔고딕" panose="020D0604000000000000" pitchFamily="50" charset="-127"/>
+                </a:endParaRPr>
               </a:p>
             </p:txBody>
           </p:sp>
         </mc:Choice>
-        <mc:Fallback xmlns="">
+        <mc:Fallback>
           <p:sp>
             <p:nvSpPr>
               <p:cNvPr id="7" name="TextBox 6"/>
@@ -3941,10 +4012,10 @@
               <a:prstGeom prst="rect">
                 <a:avLst/>
               </a:prstGeom>
-              <a:blipFill rotWithShape="1">
+              <a:blipFill>
                 <a:blip r:embed="rId4"/>
                 <a:stretch>
-                  <a:fillRect b="-18033"/>
+                  <a:fillRect b="-16393"/>
                 </a:stretch>
               </a:blipFill>
             </p:spPr>
@@ -3963,8 +4034,8 @@
           </p:sp>
         </mc:Fallback>
       </mc:AlternateContent>
-      <mc:AlternateContent xmlns:mc="http://schemas.openxmlformats.org/markup-compatibility/2006" xmlns:a14="http://schemas.microsoft.com/office/drawing/2010/main">
-        <mc:Choice Requires="a14">
+      <mc:AlternateContent xmlns:mc="http://schemas.openxmlformats.org/markup-compatibility/2006">
+        <mc:Choice xmlns:a14="http://schemas.microsoft.com/office/drawing/2010/main" Requires="a14">
           <p:sp>
             <p:nvSpPr>
               <p:cNvPr id="8" name="TextBox 7"/>
@@ -4003,12 +4074,15 @@
                     </m:oMath>
                   </m:oMathPara>
                 </a14:m>
-                <a:endParaRPr lang="ko-KR" altLang="en-US" dirty="0"/>
+                <a:endParaRPr lang="ko-KR" altLang="en-US" dirty="0">
+                  <a:latin typeface="나눔고딕" panose="020D0604000000000000" pitchFamily="50" charset="-127"/>
+                  <a:ea typeface="나눔고딕" panose="020D0604000000000000" pitchFamily="50" charset="-127"/>
+                </a:endParaRPr>
               </a:p>
             </p:txBody>
           </p:sp>
         </mc:Choice>
-        <mc:Fallback xmlns="">
+        <mc:Fallback>
           <p:sp>
             <p:nvSpPr>
               <p:cNvPr id="8" name="TextBox 7"/>
@@ -4025,10 +4099,10 @@
               <a:prstGeom prst="rect">
                 <a:avLst/>
               </a:prstGeom>
-              <a:blipFill rotWithShape="1">
+              <a:blipFill>
                 <a:blip r:embed="rId5"/>
                 <a:stretch>
-                  <a:fillRect b="-18033"/>
+                  <a:fillRect b="-16393"/>
                 </a:stretch>
               </a:blipFill>
             </p:spPr>
@@ -4047,8 +4121,8 @@
           </p:sp>
         </mc:Fallback>
       </mc:AlternateContent>
-      <mc:AlternateContent xmlns:mc="http://schemas.openxmlformats.org/markup-compatibility/2006" xmlns:a14="http://schemas.microsoft.com/office/drawing/2010/main">
-        <mc:Choice Requires="a14">
+      <mc:AlternateContent xmlns:mc="http://schemas.openxmlformats.org/markup-compatibility/2006">
+        <mc:Choice xmlns:a14="http://schemas.microsoft.com/office/drawing/2010/main" Requires="a14">
           <p:sp>
             <p:nvSpPr>
               <p:cNvPr id="9" name="TextBox 8"/>
@@ -4087,12 +4161,15 @@
                     </m:oMath>
                   </m:oMathPara>
                 </a14:m>
-                <a:endParaRPr lang="ko-KR" altLang="en-US" dirty="0"/>
+                <a:endParaRPr lang="ko-KR" altLang="en-US" dirty="0">
+                  <a:latin typeface="나눔고딕" panose="020D0604000000000000" pitchFamily="50" charset="-127"/>
+                  <a:ea typeface="나눔고딕" panose="020D0604000000000000" pitchFamily="50" charset="-127"/>
+                </a:endParaRPr>
               </a:p>
             </p:txBody>
           </p:sp>
         </mc:Choice>
-        <mc:Fallback xmlns="">
+        <mc:Fallback>
           <p:sp>
             <p:nvSpPr>
               <p:cNvPr id="9" name="TextBox 8"/>
@@ -4109,10 +4186,10 @@
               <a:prstGeom prst="rect">
                 <a:avLst/>
               </a:prstGeom>
-              <a:blipFill rotWithShape="1">
+              <a:blipFill>
                 <a:blip r:embed="rId6"/>
                 <a:stretch>
-                  <a:fillRect b="-20000"/>
+                  <a:fillRect b="-18333"/>
                 </a:stretch>
               </a:blipFill>
             </p:spPr>
@@ -4131,8 +4208,8 @@
           </p:sp>
         </mc:Fallback>
       </mc:AlternateContent>
-      <mc:AlternateContent xmlns:mc="http://schemas.openxmlformats.org/markup-compatibility/2006" xmlns:a14="http://schemas.microsoft.com/office/drawing/2010/main">
-        <mc:Choice Requires="a14">
+      <mc:AlternateContent xmlns:mc="http://schemas.openxmlformats.org/markup-compatibility/2006">
+        <mc:Choice xmlns:a14="http://schemas.microsoft.com/office/drawing/2010/main" Requires="a14">
           <p:sp>
             <p:nvSpPr>
               <p:cNvPr id="10" name="TextBox 9"/>
@@ -4171,12 +4248,15 @@
                     </m:oMath>
                   </m:oMathPara>
                 </a14:m>
-                <a:endParaRPr lang="ko-KR" altLang="en-US" dirty="0"/>
+                <a:endParaRPr lang="ko-KR" altLang="en-US" dirty="0">
+                  <a:latin typeface="나눔고딕" panose="020D0604000000000000" pitchFamily="50" charset="-127"/>
+                  <a:ea typeface="나눔고딕" panose="020D0604000000000000" pitchFamily="50" charset="-127"/>
+                </a:endParaRPr>
               </a:p>
             </p:txBody>
           </p:sp>
         </mc:Choice>
-        <mc:Fallback xmlns="">
+        <mc:Fallback>
           <p:sp>
             <p:nvSpPr>
               <p:cNvPr id="10" name="TextBox 9"/>
@@ -4193,10 +4273,10 @@
               <a:prstGeom prst="rect">
                 <a:avLst/>
               </a:prstGeom>
-              <a:blipFill rotWithShape="1">
+              <a:blipFill>
                 <a:blip r:embed="rId7"/>
                 <a:stretch>
-                  <a:fillRect b="-18033"/>
+                  <a:fillRect b="-16393"/>
                 </a:stretch>
               </a:blipFill>
             </p:spPr>
@@ -4215,8 +4295,8 @@
           </p:sp>
         </mc:Fallback>
       </mc:AlternateContent>
-      <mc:AlternateContent xmlns:mc="http://schemas.openxmlformats.org/markup-compatibility/2006" xmlns:a14="http://schemas.microsoft.com/office/drawing/2010/main">
-        <mc:Choice Requires="a14">
+      <mc:AlternateContent xmlns:mc="http://schemas.openxmlformats.org/markup-compatibility/2006">
+        <mc:Choice xmlns:a14="http://schemas.microsoft.com/office/drawing/2010/main" Requires="a14">
           <p:sp>
             <p:nvSpPr>
               <p:cNvPr id="11" name="TextBox 10"/>
@@ -4255,12 +4335,15 @@
                     </m:oMath>
                   </m:oMathPara>
                 </a14:m>
-                <a:endParaRPr lang="ko-KR" altLang="en-US" dirty="0"/>
+                <a:endParaRPr lang="ko-KR" altLang="en-US" dirty="0">
+                  <a:latin typeface="나눔고딕" panose="020D0604000000000000" pitchFamily="50" charset="-127"/>
+                  <a:ea typeface="나눔고딕" panose="020D0604000000000000" pitchFamily="50" charset="-127"/>
+                </a:endParaRPr>
               </a:p>
             </p:txBody>
           </p:sp>
         </mc:Choice>
-        <mc:Fallback xmlns="">
+        <mc:Fallback>
           <p:sp>
             <p:nvSpPr>
               <p:cNvPr id="11" name="TextBox 10"/>
@@ -4277,10 +4360,10 @@
               <a:prstGeom prst="rect">
                 <a:avLst/>
               </a:prstGeom>
-              <a:blipFill rotWithShape="1">
+              <a:blipFill>
                 <a:blip r:embed="rId8"/>
                 <a:stretch>
-                  <a:fillRect b="-18033"/>
+                  <a:fillRect b="-16393"/>
                 </a:stretch>
               </a:blipFill>
             </p:spPr>
@@ -4299,8 +4382,8 @@
           </p:sp>
         </mc:Fallback>
       </mc:AlternateContent>
-      <mc:AlternateContent xmlns:mc="http://schemas.openxmlformats.org/markup-compatibility/2006" xmlns:a14="http://schemas.microsoft.com/office/drawing/2010/main">
-        <mc:Choice Requires="a14">
+      <mc:AlternateContent xmlns:mc="http://schemas.openxmlformats.org/markup-compatibility/2006">
+        <mc:Choice xmlns:a14="http://schemas.microsoft.com/office/drawing/2010/main" Requires="a14">
           <p:sp>
             <p:nvSpPr>
               <p:cNvPr id="12" name="TextBox 11"/>
@@ -4339,12 +4422,15 @@
                     </m:oMath>
                   </m:oMathPara>
                 </a14:m>
-                <a:endParaRPr lang="ko-KR" altLang="en-US" dirty="0"/>
+                <a:endParaRPr lang="ko-KR" altLang="en-US" dirty="0">
+                  <a:latin typeface="나눔고딕" panose="020D0604000000000000" pitchFamily="50" charset="-127"/>
+                  <a:ea typeface="나눔고딕" panose="020D0604000000000000" pitchFamily="50" charset="-127"/>
+                </a:endParaRPr>
               </a:p>
             </p:txBody>
           </p:sp>
         </mc:Choice>
-        <mc:Fallback xmlns="">
+        <mc:Fallback>
           <p:sp>
             <p:nvSpPr>
               <p:cNvPr id="12" name="TextBox 11"/>
@@ -4361,10 +4447,10 @@
               <a:prstGeom prst="rect">
                 <a:avLst/>
               </a:prstGeom>
-              <a:blipFill rotWithShape="1">
+              <a:blipFill>
                 <a:blip r:embed="rId9"/>
                 <a:stretch>
-                  <a:fillRect b="-18033"/>
+                  <a:fillRect b="-16393"/>
                 </a:stretch>
               </a:blipFill>
             </p:spPr>
@@ -4383,8 +4469,8 @@
           </p:sp>
         </mc:Fallback>
       </mc:AlternateContent>
-      <mc:AlternateContent xmlns:mc="http://schemas.openxmlformats.org/markup-compatibility/2006" xmlns:a14="http://schemas.microsoft.com/office/drawing/2010/main">
-        <mc:Choice Requires="a14">
+      <mc:AlternateContent xmlns:mc="http://schemas.openxmlformats.org/markup-compatibility/2006">
+        <mc:Choice xmlns:a14="http://schemas.microsoft.com/office/drawing/2010/main" Requires="a14">
           <p:sp>
             <p:nvSpPr>
               <p:cNvPr id="13" name="TextBox 12"/>
@@ -4423,12 +4509,15 @@
                     </m:oMath>
                   </m:oMathPara>
                 </a14:m>
-                <a:endParaRPr lang="ko-KR" altLang="en-US" dirty="0"/>
+                <a:endParaRPr lang="ko-KR" altLang="en-US" dirty="0">
+                  <a:latin typeface="나눔고딕" panose="020D0604000000000000" pitchFamily="50" charset="-127"/>
+                  <a:ea typeface="나눔고딕" panose="020D0604000000000000" pitchFamily="50" charset="-127"/>
+                </a:endParaRPr>
               </a:p>
             </p:txBody>
           </p:sp>
         </mc:Choice>
-        <mc:Fallback xmlns="">
+        <mc:Fallback>
           <p:sp>
             <p:nvSpPr>
               <p:cNvPr id="13" name="TextBox 12"/>
@@ -4445,10 +4534,10 @@
               <a:prstGeom prst="rect">
                 <a:avLst/>
               </a:prstGeom>
-              <a:blipFill rotWithShape="1">
+              <a:blipFill>
                 <a:blip r:embed="rId10"/>
                 <a:stretch>
-                  <a:fillRect b="-18033"/>
+                  <a:fillRect b="-16393"/>
                 </a:stretch>
               </a:blipFill>
             </p:spPr>
@@ -4467,8 +4556,8 @@
           </p:sp>
         </mc:Fallback>
       </mc:AlternateContent>
-      <mc:AlternateContent xmlns:mc="http://schemas.openxmlformats.org/markup-compatibility/2006" xmlns:a14="http://schemas.microsoft.com/office/drawing/2010/main">
-        <mc:Choice Requires="a14">
+      <mc:AlternateContent xmlns:mc="http://schemas.openxmlformats.org/markup-compatibility/2006">
+        <mc:Choice xmlns:a14="http://schemas.microsoft.com/office/drawing/2010/main" Requires="a14">
           <p:sp>
             <p:nvSpPr>
               <p:cNvPr id="14" name="TextBox 13"/>
@@ -4507,12 +4596,15 @@
                     </m:oMath>
                   </m:oMathPara>
                 </a14:m>
-                <a:endParaRPr lang="ko-KR" altLang="en-US" dirty="0"/>
+                <a:endParaRPr lang="ko-KR" altLang="en-US" dirty="0">
+                  <a:latin typeface="나눔고딕" panose="020D0604000000000000" pitchFamily="50" charset="-127"/>
+                  <a:ea typeface="나눔고딕" panose="020D0604000000000000" pitchFamily="50" charset="-127"/>
+                </a:endParaRPr>
               </a:p>
             </p:txBody>
           </p:sp>
         </mc:Choice>
-        <mc:Fallback xmlns="">
+        <mc:Fallback>
           <p:sp>
             <p:nvSpPr>
               <p:cNvPr id="14" name="TextBox 13"/>
@@ -4529,10 +4621,10 @@
               <a:prstGeom prst="rect">
                 <a:avLst/>
               </a:prstGeom>
-              <a:blipFill rotWithShape="1">
+              <a:blipFill>
                 <a:blip r:embed="rId11"/>
                 <a:stretch>
-                  <a:fillRect b="-20000"/>
+                  <a:fillRect b="-18333"/>
                 </a:stretch>
               </a:blipFill>
             </p:spPr>
@@ -4913,8 +5005,8 @@
           </a:fontRef>
         </p:style>
       </p:cxnSp>
-      <mc:AlternateContent xmlns:mc="http://schemas.openxmlformats.org/markup-compatibility/2006" xmlns:a14="http://schemas.microsoft.com/office/drawing/2010/main">
-        <mc:Choice Requires="a14">
+      <mc:AlternateContent xmlns:mc="http://schemas.openxmlformats.org/markup-compatibility/2006">
+        <mc:Choice xmlns:a14="http://schemas.microsoft.com/office/drawing/2010/main" Requires="a14">
           <p:sp>
             <p:nvSpPr>
               <p:cNvPr id="28" name="TextBox 27"/>
@@ -4953,12 +5045,15 @@
                     </m:oMath>
                   </m:oMathPara>
                 </a14:m>
-                <a:endParaRPr lang="ko-KR" altLang="en-US" dirty="0"/>
+                <a:endParaRPr lang="ko-KR" altLang="en-US" dirty="0">
+                  <a:latin typeface="나눔고딕" panose="020D0604000000000000" pitchFamily="50" charset="-127"/>
+                  <a:ea typeface="나눔고딕" panose="020D0604000000000000" pitchFamily="50" charset="-127"/>
+                </a:endParaRPr>
               </a:p>
             </p:txBody>
           </p:sp>
         </mc:Choice>
-        <mc:Fallback xmlns="">
+        <mc:Fallback>
           <p:sp>
             <p:nvSpPr>
               <p:cNvPr id="28" name="TextBox 27"/>
@@ -4975,10 +5070,10 @@
               <a:prstGeom prst="rect">
                 <a:avLst/>
               </a:prstGeom>
-              <a:blipFill rotWithShape="1">
+              <a:blipFill>
                 <a:blip r:embed="rId12"/>
                 <a:stretch>
-                  <a:fillRect b="-20000"/>
+                  <a:fillRect b="-18333"/>
                 </a:stretch>
               </a:blipFill>
             </p:spPr>
@@ -5033,7 +5128,10 @@
           <a:lstStyle/>
           <a:p>
             <a:pPr algn="ctr"/>
-            <a:endParaRPr lang="ko-KR" altLang="en-US"/>
+            <a:endParaRPr lang="ko-KR" altLang="en-US">
+              <a:latin typeface="나눔고딕" panose="020D0604000000000000" pitchFamily="50" charset="-127"/>
+              <a:ea typeface="나눔고딕" panose="020D0604000000000000" pitchFamily="50" charset="-127"/>
+            </a:endParaRPr>
           </a:p>
         </p:txBody>
       </p:sp>
@@ -5073,12 +5171,15 @@
           <a:lstStyle/>
           <a:p>
             <a:pPr algn="ctr"/>
-            <a:endParaRPr lang="ko-KR" altLang="en-US"/>
-          </a:p>
-        </p:txBody>
-      </p:sp>
-      <mc:AlternateContent xmlns:mc="http://schemas.openxmlformats.org/markup-compatibility/2006" xmlns:a14="http://schemas.microsoft.com/office/drawing/2010/main">
-        <mc:Choice Requires="a14">
+            <a:endParaRPr lang="ko-KR" altLang="en-US">
+              <a:latin typeface="나눔고딕" panose="020D0604000000000000" pitchFamily="50" charset="-127"/>
+              <a:ea typeface="나눔고딕" panose="020D0604000000000000" pitchFamily="50" charset="-127"/>
+            </a:endParaRPr>
+          </a:p>
+        </p:txBody>
+      </p:sp>
+      <mc:AlternateContent xmlns:mc="http://schemas.openxmlformats.org/markup-compatibility/2006">
+        <mc:Choice xmlns:a14="http://schemas.microsoft.com/office/drawing/2010/main" Requires="a14">
           <p:sp>
             <p:nvSpPr>
               <p:cNvPr id="31" name="TextBox 30"/>
@@ -5117,12 +5218,15 @@
                     </m:oMath>
                   </m:oMathPara>
                 </a14:m>
-                <a:endParaRPr lang="ko-KR" altLang="en-US" dirty="0"/>
+                <a:endParaRPr lang="ko-KR" altLang="en-US" dirty="0">
+                  <a:latin typeface="나눔고딕" panose="020D0604000000000000" pitchFamily="50" charset="-127"/>
+                  <a:ea typeface="나눔고딕" panose="020D0604000000000000" pitchFamily="50" charset="-127"/>
+                </a:endParaRPr>
               </a:p>
             </p:txBody>
           </p:sp>
         </mc:Choice>
-        <mc:Fallback xmlns="">
+        <mc:Fallback>
           <p:sp>
             <p:nvSpPr>
               <p:cNvPr id="31" name="TextBox 30"/>
@@ -5139,10 +5243,10 @@
               <a:prstGeom prst="rect">
                 <a:avLst/>
               </a:prstGeom>
-              <a:blipFill rotWithShape="1">
+              <a:blipFill>
                 <a:blip r:embed="rId13"/>
                 <a:stretch>
-                  <a:fillRect b="-18033"/>
+                  <a:fillRect b="-16393"/>
                 </a:stretch>
               </a:blipFill>
             </p:spPr>
@@ -5161,6 +5265,89 @@
           </p:sp>
         </mc:Fallback>
       </mc:AlternateContent>
+      <p:sp>
+        <p:nvSpPr>
+          <p:cNvPr id="32" name="TextBox 31">
+            <a:extLst>
+              <a:ext uri="{FF2B5EF4-FFF2-40B4-BE49-F238E27FC236}">
+                <a16:creationId xmlns:a16="http://schemas.microsoft.com/office/drawing/2014/main" id="{DE86F90F-4812-41DA-8B7A-FD6B8799E892}"/>
+              </a:ext>
+            </a:extLst>
+          </p:cNvPr>
+          <p:cNvSpPr txBox="1"/>
+          <p:nvPr/>
+        </p:nvSpPr>
+        <p:spPr>
+          <a:xfrm>
+            <a:off x="2003590" y="419108"/>
+            <a:ext cx="646331" cy="369332"/>
+          </a:xfrm>
+          <a:prstGeom prst="rect">
+            <a:avLst/>
+          </a:prstGeom>
+          <a:noFill/>
+        </p:spPr>
+        <p:txBody>
+          <a:bodyPr wrap="none" rtlCol="0">
+            <a:spAutoFit/>
+          </a:bodyPr>
+          <a:lstStyle/>
+          <a:p>
+            <a:r>
+              <a:rPr lang="ko-KR" altLang="en-US" b="1" dirty="0">
+                <a:solidFill>
+                  <a:srgbClr val="FF0000"/>
+                </a:solidFill>
+              </a:rPr>
+              <a:t>입력</a:t>
+            </a:r>
+          </a:p>
+        </p:txBody>
+      </p:sp>
+      <p:sp>
+        <p:nvSpPr>
+          <p:cNvPr id="33" name="TextBox 32">
+            <a:extLst>
+              <a:ext uri="{FF2B5EF4-FFF2-40B4-BE49-F238E27FC236}">
+                <a16:creationId xmlns:a16="http://schemas.microsoft.com/office/drawing/2014/main" id="{CF783C1A-D9B3-48C4-A765-79444AD6D4FF}"/>
+              </a:ext>
+            </a:extLst>
+          </p:cNvPr>
+          <p:cNvSpPr txBox="1"/>
+          <p:nvPr/>
+        </p:nvSpPr>
+        <p:spPr>
+          <a:xfrm>
+            <a:off x="6404309" y="5526524"/>
+            <a:ext cx="646331" cy="369332"/>
+          </a:xfrm>
+          <a:prstGeom prst="rect">
+            <a:avLst/>
+          </a:prstGeom>
+          <a:noFill/>
+        </p:spPr>
+        <p:txBody>
+          <a:bodyPr wrap="none" rtlCol="0">
+            <a:spAutoFit/>
+          </a:bodyPr>
+          <a:lstStyle/>
+          <a:p>
+            <a:r>
+              <a:rPr lang="ko-KR" altLang="en-US" b="1">
+                <a:solidFill>
+                  <a:srgbClr val="FF0000"/>
+                </a:solidFill>
+              </a:rPr>
+              <a:t>출력</a:t>
+            </a:r>
+            <a:endParaRPr lang="ko-KR" altLang="en-US" b="1" dirty="0">
+              <a:solidFill>
+                <a:srgbClr val="FF0000"/>
+              </a:solidFill>
+            </a:endParaRPr>
+          </a:p>
+        </p:txBody>
+      </p:sp>
     </p:spTree>
     <p:extLst>
       <p:ext uri="{BB962C8B-B14F-4D97-AF65-F5344CB8AC3E}">
@@ -5234,90 +5421,112 @@
           <a:p>
             <a:pPr algn="ctr"/>
             <a:r>
-              <a:rPr lang="ko-KR" altLang="en-US" sz="1400" dirty="0" smtClean="0">
+              <a:rPr lang="ko-KR" altLang="en-US" sz="1400" dirty="0">
                 <a:solidFill>
                   <a:schemeClr val="tx1"/>
                 </a:solidFill>
+                <a:latin typeface="나눔고딕" panose="020D0604000000000000" pitchFamily="50" charset="-127"/>
+                <a:ea typeface="나눔고딕" panose="020D0604000000000000" pitchFamily="50" charset="-127"/>
               </a:rPr>
               <a:t>전체</a:t>
             </a:r>
-            <a:endParaRPr lang="en-US" altLang="ko-KR" sz="1400" dirty="0" smtClean="0">
+            <a:endParaRPr lang="en-US" altLang="ko-KR" sz="1400" dirty="0">
               <a:solidFill>
                 <a:schemeClr val="tx1"/>
               </a:solidFill>
+              <a:latin typeface="나눔고딕" panose="020D0604000000000000" pitchFamily="50" charset="-127"/>
+              <a:ea typeface="나눔고딕" panose="020D0604000000000000" pitchFamily="50" charset="-127"/>
             </a:endParaRPr>
           </a:p>
           <a:p>
             <a:pPr algn="ctr"/>
             <a:r>
-              <a:rPr lang="ko-KR" altLang="en-US" sz="1400" dirty="0" smtClean="0">
+              <a:rPr lang="ko-KR" altLang="en-US" sz="1400" dirty="0">
                 <a:solidFill>
                   <a:schemeClr val="tx1"/>
                 </a:solidFill>
+                <a:latin typeface="나눔고딕" panose="020D0604000000000000" pitchFamily="50" charset="-127"/>
+                <a:ea typeface="나눔고딕" panose="020D0604000000000000" pitchFamily="50" charset="-127"/>
               </a:rPr>
               <a:t>미분방정식</a:t>
             </a:r>
-            <a:endParaRPr lang="en-US" altLang="ko-KR" sz="1400" dirty="0" smtClean="0">
+            <a:endParaRPr lang="en-US" altLang="ko-KR" sz="1400" dirty="0">
               <a:solidFill>
                 <a:schemeClr val="tx1"/>
               </a:solidFill>
+              <a:latin typeface="나눔고딕" panose="020D0604000000000000" pitchFamily="50" charset="-127"/>
+              <a:ea typeface="나눔고딕" panose="020D0604000000000000" pitchFamily="50" charset="-127"/>
             </a:endParaRPr>
           </a:p>
           <a:p>
             <a:pPr algn="ctr"/>
             <a:r>
-              <a:rPr lang="ko-KR" altLang="en-US" sz="1400" dirty="0" smtClean="0">
+              <a:rPr lang="ko-KR" altLang="en-US" sz="1400" dirty="0">
                 <a:solidFill>
                   <a:schemeClr val="tx1"/>
                 </a:solidFill>
+                <a:latin typeface="나눔고딕" panose="020D0604000000000000" pitchFamily="50" charset="-127"/>
+                <a:ea typeface="나눔고딕" panose="020D0604000000000000" pitchFamily="50" charset="-127"/>
               </a:rPr>
               <a:t>시스템</a:t>
             </a:r>
-            <a:endParaRPr lang="en-US" altLang="ko-KR" sz="1400" dirty="0" smtClean="0">
+            <a:endParaRPr lang="en-US" altLang="ko-KR" sz="1400" dirty="0">
               <a:solidFill>
                 <a:schemeClr val="tx1"/>
               </a:solidFill>
+              <a:latin typeface="나눔고딕" panose="020D0604000000000000" pitchFamily="50" charset="-127"/>
+              <a:ea typeface="나눔고딕" panose="020D0604000000000000" pitchFamily="50" charset="-127"/>
             </a:endParaRPr>
           </a:p>
           <a:p>
             <a:pPr algn="ctr"/>
             <a:r>
-              <a:rPr lang="en-US" altLang="ko-KR" sz="1400" dirty="0" smtClean="0">
+              <a:rPr lang="en-US" altLang="ko-KR" sz="1400" dirty="0">
                 <a:solidFill>
                   <a:schemeClr val="tx1"/>
                 </a:solidFill>
+                <a:latin typeface="나눔고딕" panose="020D0604000000000000" pitchFamily="50" charset="-127"/>
+                <a:ea typeface="나눔고딕" panose="020D0604000000000000" pitchFamily="50" charset="-127"/>
               </a:rPr>
               <a:t>(</a:t>
             </a:r>
             <a:r>
-              <a:rPr lang="ko-KR" altLang="en-US" sz="1400" dirty="0" smtClean="0">
+              <a:rPr lang="ko-KR" altLang="en-US" sz="1400" dirty="0">
                 <a:solidFill>
                   <a:schemeClr val="tx1"/>
                 </a:solidFill>
+                <a:latin typeface="나눔고딕" panose="020D0604000000000000" pitchFamily="50" charset="-127"/>
+                <a:ea typeface="나눔고딕" panose="020D0604000000000000" pitchFamily="50" charset="-127"/>
               </a:rPr>
               <a:t>제차</a:t>
             </a:r>
             <a:r>
-              <a:rPr lang="en-US" altLang="ko-KR" sz="1400" dirty="0" smtClean="0">
+              <a:rPr lang="en-US" altLang="ko-KR" sz="1400" dirty="0">
                 <a:solidFill>
                   <a:schemeClr val="tx1"/>
                 </a:solidFill>
+                <a:latin typeface="나눔고딕" panose="020D0604000000000000" pitchFamily="50" charset="-127"/>
+                <a:ea typeface="나눔고딕" panose="020D0604000000000000" pitchFamily="50" charset="-127"/>
               </a:rPr>
               <a:t>+</a:t>
             </a:r>
             <a:r>
-              <a:rPr lang="ko-KR" altLang="en-US" sz="1400" dirty="0" smtClean="0">
+              <a:rPr lang="ko-KR" altLang="en-US" sz="1400" dirty="0">
                 <a:solidFill>
                   <a:schemeClr val="tx1"/>
                 </a:solidFill>
+                <a:latin typeface="나눔고딕" panose="020D0604000000000000" pitchFamily="50" charset="-127"/>
+                <a:ea typeface="나눔고딕" panose="020D0604000000000000" pitchFamily="50" charset="-127"/>
               </a:rPr>
               <a:t>비제차</a:t>
             </a:r>
             <a:r>
-              <a:rPr lang="en-US" altLang="ko-KR" sz="1400" dirty="0" smtClean="0">
+              <a:rPr lang="en-US" altLang="ko-KR" sz="1400" dirty="0">
                 <a:solidFill>
                   <a:schemeClr val="tx1"/>
                 </a:solidFill>
+                <a:latin typeface="나눔고딕" panose="020D0604000000000000" pitchFamily="50" charset="-127"/>
+                <a:ea typeface="나눔고딕" panose="020D0604000000000000" pitchFamily="50" charset="-127"/>
               </a:rPr>
               <a:t>)</a:t>
             </a:r>
@@ -5325,6 +5534,8 @@
               <a:solidFill>
                 <a:schemeClr val="tx1"/>
               </a:solidFill>
+              <a:latin typeface="나눔고딕" panose="020D0604000000000000" pitchFamily="50" charset="-127"/>
+              <a:ea typeface="나눔고딕" panose="020D0604000000000000" pitchFamily="50" charset="-127"/>
             </a:endParaRPr>
           </a:p>
         </p:txBody>
@@ -5352,8 +5563,8 @@
         </p:blipFill>
         <p:spPr bwMode="auto">
           <a:xfrm>
-            <a:off x="201336" y="2060849"/>
-            <a:ext cx="3650584" cy="2736304"/>
+            <a:off x="107504" y="2115160"/>
+            <a:ext cx="3399681" cy="2548239"/>
           </a:xfrm>
           <a:prstGeom prst="rect">
             <a:avLst/>
@@ -5416,8 +5627,8 @@
         </p:blipFill>
         <p:spPr bwMode="auto">
           <a:xfrm>
-            <a:off x="5212086" y="1684578"/>
-            <a:ext cx="3960439" cy="2968558"/>
+            <a:off x="5521941" y="1745828"/>
+            <a:ext cx="3650584" cy="2736305"/>
           </a:xfrm>
           <a:prstGeom prst="rect">
             <a:avLst/>
@@ -5457,6 +5668,250 @@
           </a:extLst>
         </p:spPr>
       </p:pic>
+      <p:cxnSp>
+        <p:nvCxnSpPr>
+          <p:cNvPr id="4" name="직선 화살표 연결선 3">
+            <a:extLst>
+              <a:ext uri="{FF2B5EF4-FFF2-40B4-BE49-F238E27FC236}">
+                <a16:creationId xmlns:a16="http://schemas.microsoft.com/office/drawing/2014/main" id="{115EE6A1-1C7C-4095-9621-716CB44F45FD}"/>
+              </a:ext>
+            </a:extLst>
+          </p:cNvPr>
+          <p:cNvCxnSpPr/>
+          <p:nvPr/>
+        </p:nvCxnSpPr>
+        <p:spPr>
+          <a:xfrm flipH="1">
+            <a:off x="2360157" y="2402619"/>
+            <a:ext cx="436368" cy="648072"/>
+          </a:xfrm>
+          <a:prstGeom prst="straightConnector1">
+            <a:avLst/>
+          </a:prstGeom>
+          <a:ln w="38100">
+            <a:solidFill>
+              <a:srgbClr val="FF0000"/>
+            </a:solidFill>
+            <a:tailEnd type="triangle"/>
+          </a:ln>
+        </p:spPr>
+        <p:style>
+          <a:lnRef idx="1">
+            <a:schemeClr val="accent1"/>
+          </a:lnRef>
+          <a:fillRef idx="0">
+            <a:schemeClr val="accent1"/>
+          </a:fillRef>
+          <a:effectRef idx="0">
+            <a:schemeClr val="accent1"/>
+          </a:effectRef>
+          <a:fontRef idx="minor">
+            <a:schemeClr val="tx1"/>
+          </a:fontRef>
+        </p:style>
+      </p:cxnSp>
+      <p:cxnSp>
+        <p:nvCxnSpPr>
+          <p:cNvPr id="7" name="직선 화살표 연결선 6">
+            <a:extLst>
+              <a:ext uri="{FF2B5EF4-FFF2-40B4-BE49-F238E27FC236}">
+                <a16:creationId xmlns:a16="http://schemas.microsoft.com/office/drawing/2014/main" id="{6954C3A5-9BF1-454C-9670-467EFE959EC0}"/>
+              </a:ext>
+            </a:extLst>
+          </p:cNvPr>
+          <p:cNvCxnSpPr>
+            <a:cxnSpLocks/>
+          </p:cNvCxnSpPr>
+          <p:nvPr/>
+        </p:nvCxnSpPr>
+        <p:spPr>
+          <a:xfrm>
+            <a:off x="7596336" y="3137527"/>
+            <a:ext cx="288032" cy="764211"/>
+          </a:xfrm>
+          <a:prstGeom prst="straightConnector1">
+            <a:avLst/>
+          </a:prstGeom>
+          <a:ln w="38100">
+            <a:solidFill>
+              <a:srgbClr val="FF0000"/>
+            </a:solidFill>
+            <a:tailEnd type="triangle"/>
+          </a:ln>
+        </p:spPr>
+        <p:style>
+          <a:lnRef idx="1">
+            <a:schemeClr val="accent1"/>
+          </a:lnRef>
+          <a:fillRef idx="0">
+            <a:schemeClr val="accent1"/>
+          </a:fillRef>
+          <a:effectRef idx="0">
+            <a:schemeClr val="accent1"/>
+          </a:effectRef>
+          <a:fontRef idx="minor">
+            <a:schemeClr val="tx1"/>
+          </a:fontRef>
+        </p:style>
+      </p:cxnSp>
+      <p:cxnSp>
+        <p:nvCxnSpPr>
+          <p:cNvPr id="10" name="직선 화살표 연결선 9">
+            <a:extLst>
+              <a:ext uri="{FF2B5EF4-FFF2-40B4-BE49-F238E27FC236}">
+                <a16:creationId xmlns:a16="http://schemas.microsoft.com/office/drawing/2014/main" id="{B22C35A0-29BA-499C-8FBB-32B27C547BD1}"/>
+              </a:ext>
+            </a:extLst>
+          </p:cNvPr>
+          <p:cNvCxnSpPr/>
+          <p:nvPr/>
+        </p:nvCxnSpPr>
+        <p:spPr>
+          <a:xfrm>
+            <a:off x="3033841" y="3113981"/>
+            <a:ext cx="314023" cy="0"/>
+          </a:xfrm>
+          <a:prstGeom prst="straightConnector1">
+            <a:avLst/>
+          </a:prstGeom>
+          <a:ln w="38100">
+            <a:solidFill>
+              <a:schemeClr val="tx1"/>
+            </a:solidFill>
+            <a:tailEnd type="arrow"/>
+          </a:ln>
+        </p:spPr>
+        <p:style>
+          <a:lnRef idx="1">
+            <a:schemeClr val="accent1"/>
+          </a:lnRef>
+          <a:fillRef idx="0">
+            <a:schemeClr val="accent1"/>
+          </a:fillRef>
+          <a:effectRef idx="0">
+            <a:schemeClr val="accent1"/>
+          </a:effectRef>
+          <a:fontRef idx="minor">
+            <a:schemeClr val="tx1"/>
+          </a:fontRef>
+        </p:style>
+      </p:cxnSp>
+      <p:cxnSp>
+        <p:nvCxnSpPr>
+          <p:cNvPr id="11" name="직선 화살표 연결선 10">
+            <a:extLst>
+              <a:ext uri="{FF2B5EF4-FFF2-40B4-BE49-F238E27FC236}">
+                <a16:creationId xmlns:a16="http://schemas.microsoft.com/office/drawing/2014/main" id="{6ED94E00-41DD-4597-8942-4B2C9332E32E}"/>
+              </a:ext>
+            </a:extLst>
+          </p:cNvPr>
+          <p:cNvCxnSpPr/>
+          <p:nvPr/>
+        </p:nvCxnSpPr>
+        <p:spPr>
+          <a:xfrm>
+            <a:off x="5724128" y="3113981"/>
+            <a:ext cx="314023" cy="0"/>
+          </a:xfrm>
+          <a:prstGeom prst="straightConnector1">
+            <a:avLst/>
+          </a:prstGeom>
+          <a:ln w="38100">
+            <a:solidFill>
+              <a:schemeClr val="tx1"/>
+            </a:solidFill>
+            <a:tailEnd type="arrow"/>
+          </a:ln>
+        </p:spPr>
+        <p:style>
+          <a:lnRef idx="1">
+            <a:schemeClr val="accent1"/>
+          </a:lnRef>
+          <a:fillRef idx="0">
+            <a:schemeClr val="accent1"/>
+          </a:fillRef>
+          <a:effectRef idx="0">
+            <a:schemeClr val="accent1"/>
+          </a:effectRef>
+          <a:fontRef idx="minor">
+            <a:schemeClr val="tx1"/>
+          </a:fontRef>
+        </p:style>
+      </p:cxnSp>
+      <p:sp>
+        <p:nvSpPr>
+          <p:cNvPr id="8" name="TextBox 7">
+            <a:extLst>
+              <a:ext uri="{FF2B5EF4-FFF2-40B4-BE49-F238E27FC236}">
+                <a16:creationId xmlns:a16="http://schemas.microsoft.com/office/drawing/2014/main" id="{FE908FA0-B480-4749-8041-F1F510B40F15}"/>
+              </a:ext>
+            </a:extLst>
+          </p:cNvPr>
+          <p:cNvSpPr txBox="1"/>
+          <p:nvPr/>
+        </p:nvSpPr>
+        <p:spPr>
+          <a:xfrm>
+            <a:off x="1344203" y="1745828"/>
+            <a:ext cx="1189749" cy="369332"/>
+          </a:xfrm>
+          <a:prstGeom prst="rect">
+            <a:avLst/>
+          </a:prstGeom>
+          <a:noFill/>
+        </p:spPr>
+        <p:txBody>
+          <a:bodyPr wrap="none" rtlCol="0">
+            <a:spAutoFit/>
+          </a:bodyPr>
+          <a:lstStyle/>
+          <a:p>
+            <a:r>
+              <a:rPr lang="ko-KR" altLang="en-US" dirty="0"/>
+              <a:t>입력 함수</a:t>
+            </a:r>
+          </a:p>
+        </p:txBody>
+      </p:sp>
+      <p:sp>
+        <p:nvSpPr>
+          <p:cNvPr id="13" name="TextBox 12">
+            <a:extLst>
+              <a:ext uri="{FF2B5EF4-FFF2-40B4-BE49-F238E27FC236}">
+                <a16:creationId xmlns:a16="http://schemas.microsoft.com/office/drawing/2014/main" id="{8F1B0FE0-C874-4DE7-9EC3-91C472ECF94D}"/>
+              </a:ext>
+            </a:extLst>
+          </p:cNvPr>
+          <p:cNvSpPr txBox="1"/>
+          <p:nvPr/>
+        </p:nvSpPr>
+        <p:spPr>
+          <a:xfrm>
+            <a:off x="6804248" y="1745828"/>
+            <a:ext cx="1189749" cy="369332"/>
+          </a:xfrm>
+          <a:prstGeom prst="rect">
+            <a:avLst/>
+          </a:prstGeom>
+          <a:noFill/>
+        </p:spPr>
+        <p:txBody>
+          <a:bodyPr wrap="none" rtlCol="0">
+            <a:spAutoFit/>
+          </a:bodyPr>
+          <a:lstStyle/>
+          <a:p>
+            <a:r>
+              <a:rPr lang="ko-KR" altLang="en-US"/>
+              <a:t>출력 </a:t>
+            </a:r>
+            <a:r>
+              <a:rPr lang="ko-KR" altLang="en-US" dirty="0"/>
+              <a:t>함수</a:t>
+            </a:r>
+          </a:p>
+        </p:txBody>
+      </p:sp>
     </p:spTree>
     <p:extLst>
       <p:ext uri="{BB962C8B-B14F-4D97-AF65-F5344CB8AC3E}">

</xml_diff>